<commit_message>
Cambios en las situaciones - Ivan Alejandro
</commit_message>
<xml_diff>
--- a/TG2/TG2_Presentacion_Ivan_Alejandro.pptx
+++ b/TG2/TG2_Presentacion_Ivan_Alejandro.pptx
@@ -20,14 +20,14 @@
   <p:notesSz cx="6858000" cy="9144000"/>
   <p:embeddedFontLst>
     <p:embeddedFont>
-      <p:font typeface="Raleway" panose="020B0604020202020204" charset="0"/>
+      <p:font typeface="Lato" panose="020B0604020202020204" charset="0"/>
       <p:regular r:id="rId10"/>
       <p:bold r:id="rId11"/>
       <p:italic r:id="rId12"/>
       <p:boldItalic r:id="rId13"/>
     </p:embeddedFont>
     <p:embeddedFont>
-      <p:font typeface="Lato" panose="020B0604020202020204" charset="0"/>
+      <p:font typeface="Raleway" panose="020B0604020202020204" charset="0"/>
       <p:regular r:id="rId14"/>
       <p:bold r:id="rId15"/>
       <p:italic r:id="rId16"/>
@@ -4561,7 +4561,7 @@
         </p:nvSpPr>
         <p:spPr>
           <a:xfrm>
-            <a:off x="1207008" y="4183114"/>
+            <a:off x="1324573" y="2210623"/>
             <a:ext cx="6419088" cy="553357"/>
           </a:xfrm>
           <a:prstGeom prst="rect">
@@ -4606,245 +4606,6 @@
           </a:p>
         </p:txBody>
       </p:sp>
-      <p:graphicFrame>
-        <p:nvGraphicFramePr>
-          <p:cNvPr id="5" name="Tabla 4"/>
-          <p:cNvGraphicFramePr>
-            <a:graphicFrameLocks noGrp="1"/>
-          </p:cNvGraphicFramePr>
-          <p:nvPr>
-            <p:extLst>
-              <p:ext uri="{D42A27DB-BD31-4B8C-83A1-F6EECF244321}">
-                <p14:modId xmlns:p14="http://schemas.microsoft.com/office/powerpoint/2010/main" val="3330202185"/>
-              </p:ext>
-            </p:extLst>
-          </p:nvPr>
-        </p:nvGraphicFramePr>
-        <p:xfrm>
-          <a:off x="1207008" y="2334641"/>
-          <a:ext cx="7057596" cy="1065594"/>
-        </p:xfrm>
-        <a:graphic>
-          <a:graphicData uri="http://schemas.openxmlformats.org/drawingml/2006/table">
-            <a:tbl>
-              <a:tblPr firstRow="1" firstCol="1" bandRow="1">
-                <a:tableStyleId>{070A63BD-01B4-4B4B-9D4A-FC97D9B464FF}</a:tableStyleId>
-              </a:tblPr>
-              <a:tblGrid>
-                <a:gridCol w="2116282">
-                  <a:extLst>
-                    <a:ext uri="{9D8B030D-6E8A-4147-A177-3AD203B41FA5}">
-                      <a16:colId xmlns:a16="http://schemas.microsoft.com/office/drawing/2014/main" val="3624364740"/>
-                    </a:ext>
-                  </a:extLst>
-                </a:gridCol>
-                <a:gridCol w="2590721">
-                  <a:extLst>
-                    <a:ext uri="{9D8B030D-6E8A-4147-A177-3AD203B41FA5}">
-                      <a16:colId xmlns:a16="http://schemas.microsoft.com/office/drawing/2014/main" val="1751119912"/>
-                    </a:ext>
-                  </a:extLst>
-                </a:gridCol>
-                <a:gridCol w="2350593">
-                  <a:extLst>
-                    <a:ext uri="{9D8B030D-6E8A-4147-A177-3AD203B41FA5}">
-                      <a16:colId xmlns:a16="http://schemas.microsoft.com/office/drawing/2014/main" val="773433935"/>
-                    </a:ext>
-                  </a:extLst>
-                </a:gridCol>
-              </a:tblGrid>
-              <a:tr h="731307">
-                <a:tc>
-                  <a:txBody>
-                    <a:bodyPr/>
-                    <a:lstStyle/>
-                    <a:p>
-                      <a:pPr algn="just">
-                        <a:lnSpc>
-                          <a:spcPct val="107000"/>
-                        </a:lnSpc>
-                        <a:spcAft>
-                          <a:spcPts val="0"/>
-                        </a:spcAft>
-                      </a:pPr>
-                      <a:r>
-                        <a:rPr lang="es-ES" sz="1100">
-                          <a:effectLst/>
-                        </a:rPr>
-                        <a:t>Criterios relevantes para la decisión</a:t>
-                      </a:r>
-                      <a:endParaRPr lang="es-ES" sz="1100">
-                        <a:effectLst/>
-                        <a:latin typeface="Arial" panose="020B0604020202020204" pitchFamily="34" charset="0"/>
-                        <a:ea typeface="Calibri" panose="020F0502020204030204" pitchFamily="34" charset="0"/>
-                        <a:cs typeface="Times New Roman" panose="02020603050405020304" pitchFamily="18" charset="0"/>
-                      </a:endParaRPr>
-                    </a:p>
-                  </a:txBody>
-                  <a:tcPr marL="68580" marR="68580" marT="0" marB="0"/>
-                </a:tc>
-                <a:tc>
-                  <a:txBody>
-                    <a:bodyPr/>
-                    <a:lstStyle/>
-                    <a:p>
-                      <a:pPr algn="just">
-                        <a:lnSpc>
-                          <a:spcPct val="107000"/>
-                        </a:lnSpc>
-                        <a:spcAft>
-                          <a:spcPts val="0"/>
-                        </a:spcAft>
-                      </a:pPr>
-                      <a:r>
-                        <a:rPr lang="es-ES" sz="1100">
-                          <a:effectLst/>
-                        </a:rPr>
-                        <a:t>Ventajas Icinga</a:t>
-                      </a:r>
-                      <a:endParaRPr lang="es-ES" sz="1100">
-                        <a:effectLst/>
-                        <a:latin typeface="Arial" panose="020B0604020202020204" pitchFamily="34" charset="0"/>
-                        <a:ea typeface="Calibri" panose="020F0502020204030204" pitchFamily="34" charset="0"/>
-                        <a:cs typeface="Times New Roman" panose="02020603050405020304" pitchFamily="18" charset="0"/>
-                      </a:endParaRPr>
-                    </a:p>
-                  </a:txBody>
-                  <a:tcPr marL="68580" marR="68580" marT="0" marB="0"/>
-                </a:tc>
-                <a:tc>
-                  <a:txBody>
-                    <a:bodyPr/>
-                    <a:lstStyle/>
-                    <a:p>
-                      <a:pPr algn="just">
-                        <a:lnSpc>
-                          <a:spcPct val="107000"/>
-                        </a:lnSpc>
-                        <a:spcAft>
-                          <a:spcPts val="0"/>
-                        </a:spcAft>
-                      </a:pPr>
-                      <a:r>
-                        <a:rPr lang="es-ES" sz="1100">
-                          <a:effectLst/>
-                        </a:rPr>
-                        <a:t>Ventajas PandoraFMS</a:t>
-                      </a:r>
-                      <a:endParaRPr lang="es-ES" sz="1100">
-                        <a:effectLst/>
-                        <a:latin typeface="Arial" panose="020B0604020202020204" pitchFamily="34" charset="0"/>
-                        <a:ea typeface="Calibri" panose="020F0502020204030204" pitchFamily="34" charset="0"/>
-                        <a:cs typeface="Times New Roman" panose="02020603050405020304" pitchFamily="18" charset="0"/>
-                      </a:endParaRPr>
-                    </a:p>
-                  </a:txBody>
-                  <a:tcPr marL="68580" marR="68580" marT="0" marB="0"/>
-                </a:tc>
-                <a:extLst>
-                  <a:ext uri="{0D108BD9-81ED-4DB2-BD59-A6C34878D82A}">
-                    <a16:rowId xmlns:a16="http://schemas.microsoft.com/office/drawing/2014/main" val="1514123723"/>
-                  </a:ext>
-                </a:extLst>
-              </a:tr>
-              <a:tr h="334287">
-                <a:tc>
-                  <a:txBody>
-                    <a:bodyPr/>
-                    <a:lstStyle/>
-                    <a:p>
-                      <a:pPr algn="just">
-                        <a:lnSpc>
-                          <a:spcPct val="107000"/>
-                        </a:lnSpc>
-                        <a:spcAft>
-                          <a:spcPts val="0"/>
-                        </a:spcAft>
-                      </a:pPr>
-                      <a:r>
-                        <a:rPr lang="es-ES" sz="1100">
-                          <a:effectLst/>
-                        </a:rPr>
-                        <a:t>C.1. Multiplataforma</a:t>
-                      </a:r>
-                      <a:endParaRPr lang="es-ES" sz="1100">
-                        <a:effectLst/>
-                        <a:latin typeface="Arial" panose="020B0604020202020204" pitchFamily="34" charset="0"/>
-                        <a:ea typeface="Calibri" panose="020F0502020204030204" pitchFamily="34" charset="0"/>
-                        <a:cs typeface="Times New Roman" panose="02020603050405020304" pitchFamily="18" charset="0"/>
-                      </a:endParaRPr>
-                    </a:p>
-                  </a:txBody>
-                  <a:tcPr marL="68580" marR="68580" marT="0" marB="0"/>
-                </a:tc>
-                <a:tc>
-                  <a:txBody>
-                    <a:bodyPr/>
-                    <a:lstStyle/>
-                    <a:p>
-                      <a:pPr algn="just">
-                        <a:lnSpc>
-                          <a:spcPct val="107000"/>
-                        </a:lnSpc>
-                        <a:spcAft>
-                          <a:spcPts val="0"/>
-                        </a:spcAft>
-                      </a:pPr>
-                      <a:r>
-                        <a:rPr lang="es-ES" sz="1100">
-                          <a:effectLst/>
-                        </a:rPr>
-                        <a:t>No</a:t>
-                      </a:r>
-                      <a:endParaRPr lang="es-ES" sz="1100">
-                        <a:effectLst/>
-                        <a:latin typeface="Arial" panose="020B0604020202020204" pitchFamily="34" charset="0"/>
-                        <a:ea typeface="Calibri" panose="020F0502020204030204" pitchFamily="34" charset="0"/>
-                        <a:cs typeface="Times New Roman" panose="02020603050405020304" pitchFamily="18" charset="0"/>
-                      </a:endParaRPr>
-                    </a:p>
-                  </a:txBody>
-                  <a:tcPr marL="68580" marR="68580" marT="0" marB="0"/>
-                </a:tc>
-                <a:tc>
-                  <a:txBody>
-                    <a:bodyPr/>
-                    <a:lstStyle/>
-                    <a:p>
-                      <a:pPr algn="just">
-                        <a:lnSpc>
-                          <a:spcPct val="107000"/>
-                        </a:lnSpc>
-                        <a:spcAft>
-                          <a:spcPts val="0"/>
-                        </a:spcAft>
-                      </a:pPr>
-                      <a:r>
-                        <a:rPr lang="es-ES" sz="1100" dirty="0">
-                          <a:effectLst/>
-                        </a:rPr>
-                        <a:t>Si</a:t>
-                      </a:r>
-                      <a:endParaRPr lang="es-ES" sz="1100" dirty="0">
-                        <a:effectLst/>
-                        <a:latin typeface="Arial" panose="020B0604020202020204" pitchFamily="34" charset="0"/>
-                        <a:ea typeface="Calibri" panose="020F0502020204030204" pitchFamily="34" charset="0"/>
-                        <a:cs typeface="Times New Roman" panose="02020603050405020304" pitchFamily="18" charset="0"/>
-                      </a:endParaRPr>
-                    </a:p>
-                  </a:txBody>
-                  <a:tcPr marL="68580" marR="68580" marT="0" marB="0"/>
-                </a:tc>
-                <a:extLst>
-                  <a:ext uri="{0D108BD9-81ED-4DB2-BD59-A6C34878D82A}">
-                    <a16:rowId xmlns:a16="http://schemas.microsoft.com/office/drawing/2014/main" val="203380786"/>
-                  </a:ext>
-                </a:extLst>
-              </a:tr>
-            </a:tbl>
-          </a:graphicData>
-        </a:graphic>
-      </p:graphicFrame>
     </p:spTree>
     <p:extLst>
       <p:ext uri="{BB962C8B-B14F-4D97-AF65-F5344CB8AC3E}">

</xml_diff>